<commit_message>
Added QRCode info to presentation
</commit_message>
<xml_diff>
--- a/docs/OTAService.pptx
+++ b/docs/OTAService.pptx
@@ -5,10 +5,10 @@
     <p:sldMasterId id="2147483660" r:id="rId1"/>
   </p:sldMasterIdLst>
   <p:notesMasterIdLst>
-    <p:notesMasterId r:id="rId19"/>
+    <p:notesMasterId r:id="rId21"/>
   </p:notesMasterIdLst>
   <p:handoutMasterIdLst>
-    <p:handoutMasterId r:id="rId20"/>
+    <p:handoutMasterId r:id="rId22"/>
   </p:handoutMasterIdLst>
   <p:sldIdLst>
     <p:sldId id="340" r:id="rId2"/>
@@ -20,14 +20,16 @@
     <p:sldId id="352" r:id="rId8"/>
     <p:sldId id="347" r:id="rId9"/>
     <p:sldId id="354" r:id="rId10"/>
-    <p:sldId id="355" r:id="rId11"/>
-    <p:sldId id="351" r:id="rId12"/>
-    <p:sldId id="350" r:id="rId13"/>
-    <p:sldId id="356" r:id="rId14"/>
-    <p:sldId id="310" r:id="rId15"/>
-    <p:sldId id="348" r:id="rId16"/>
-    <p:sldId id="265" r:id="rId17"/>
-    <p:sldId id="339" r:id="rId18"/>
+    <p:sldId id="359" r:id="rId11"/>
+    <p:sldId id="360" r:id="rId12"/>
+    <p:sldId id="355" r:id="rId13"/>
+    <p:sldId id="351" r:id="rId14"/>
+    <p:sldId id="350" r:id="rId15"/>
+    <p:sldId id="356" r:id="rId16"/>
+    <p:sldId id="310" r:id="rId17"/>
+    <p:sldId id="348" r:id="rId18"/>
+    <p:sldId id="265" r:id="rId19"/>
+    <p:sldId id="339" r:id="rId20"/>
   </p:sldIdLst>
   <p:sldSz cx="12195175" cy="6859588"/>
   <p:notesSz cx="6858000" cy="9144000"/>
@@ -603,7 +605,7 @@
             <a:fld id="{7D8C2C35-2B8A-446E-BEC0-FD36716C29AC}" type="slidenum">
               <a:rPr lang="de-DE" smtClean="0"/>
               <a:pPr/>
-              <a:t>10</a:t>
+              <a:t>12</a:t>
             </a:fld>
             <a:endParaRPr lang="de-DE" dirty="0"/>
           </a:p>
@@ -1896,7 +1898,7 @@
             <a:fld id="{7D8C2C35-2B8A-446E-BEC0-FD36716C29AC}" type="slidenum">
               <a:rPr lang="de-DE" smtClean="0"/>
               <a:pPr/>
-              <a:t>11</a:t>
+              <a:t>13</a:t>
             </a:fld>
             <a:endParaRPr lang="de-DE" dirty="0"/>
           </a:p>
@@ -3156,7 +3158,7 @@
             <a:fld id="{7D8C2C35-2B8A-446E-BEC0-FD36716C29AC}" type="slidenum">
               <a:rPr lang="de-DE" smtClean="0"/>
               <a:pPr/>
-              <a:t>12</a:t>
+              <a:t>14</a:t>
             </a:fld>
             <a:endParaRPr lang="de-DE" dirty="0"/>
           </a:p>
@@ -3248,7 +3250,7 @@
             <a:fld id="{7D8C2C35-2B8A-446E-BEC0-FD36716C29AC}" type="slidenum">
               <a:rPr lang="de-DE" smtClean="0"/>
               <a:pPr/>
-              <a:t>13</a:t>
+              <a:t>15</a:t>
             </a:fld>
             <a:endParaRPr lang="de-DE" dirty="0"/>
           </a:p>
@@ -3302,7 +3304,7 @@
             <a:fld id="{7D8C2C35-2B8A-446E-BEC0-FD36716C29AC}" type="slidenum">
               <a:rPr lang="de-DE" smtClean="0"/>
               <a:pPr/>
-              <a:t>14</a:t>
+              <a:t>16</a:t>
             </a:fld>
             <a:endParaRPr lang="de-DE" dirty="0"/>
           </a:p>
@@ -3389,7 +3391,7 @@
             <a:fld id="{7D8C2C35-2B8A-446E-BEC0-FD36716C29AC}" type="slidenum">
               <a:rPr lang="de-DE" smtClean="0"/>
               <a:pPr/>
-              <a:t>16</a:t>
+              <a:t>18</a:t>
             </a:fld>
             <a:endParaRPr lang="de-DE" dirty="0"/>
           </a:p>
@@ -3476,7 +3478,7 @@
             <a:fld id="{7D8C2C35-2B8A-446E-BEC0-FD36716C29AC}" type="slidenum">
               <a:rPr lang="de-DE" smtClean="0"/>
               <a:pPr/>
-              <a:t>17</a:t>
+              <a:t>19</a:t>
             </a:fld>
             <a:endParaRPr lang="de-DE" dirty="0"/>
           </a:p>
@@ -10314,6 +10316,523 @@
       </p:grpSpPr>
       <p:sp>
         <p:nvSpPr>
+          <p:cNvPr id="2" name="Title 1"/>
+          <p:cNvSpPr>
+            <a:spLocks noGrp="1"/>
+          </p:cNvSpPr>
+          <p:nvPr>
+            <p:ph type="title"/>
+          </p:nvPr>
+        </p:nvSpPr>
+        <p:spPr/>
+        <p:txBody>
+          <a:bodyPr/>
+          <a:lstStyle/>
+          <a:p>
+            <a:r>
+              <a:rPr lang="de-DE" dirty="0" smtClean="0"/>
+              <a:t>Features </a:t>
+            </a:r>
+            <a:r>
+              <a:rPr lang="de-DE" dirty="0" err="1" smtClean="0"/>
+              <a:t>of</a:t>
+            </a:r>
+            <a:r>
+              <a:rPr lang="de-DE" dirty="0" smtClean="0"/>
+              <a:t> </a:t>
+            </a:r>
+            <a:r>
+              <a:rPr lang="de-DE" dirty="0" err="1" smtClean="0"/>
+              <a:t>the</a:t>
+            </a:r>
+            <a:r>
+              <a:rPr lang="de-DE" dirty="0" smtClean="0"/>
+              <a:t> OTA Service</a:t>
+            </a:r>
+            <a:endParaRPr lang="en-US" dirty="0"/>
+          </a:p>
+        </p:txBody>
+      </p:sp>
+      <p:pic>
+        <p:nvPicPr>
+          <p:cNvPr id="1026" name="Picture 2" descr="D:\temp\Capture3.PNG"/>
+          <p:cNvPicPr>
+            <a:picLocks noChangeAspect="1" noChangeArrowheads="1"/>
+          </p:cNvPicPr>
+          <p:nvPr/>
+        </p:nvPicPr>
+        <p:blipFill>
+          <a:blip r:embed="rId2">
+            <a:extLst>
+              <a:ext uri="{28A0092B-C50C-407E-A947-70E740481C1C}">
+                <a14:useLocalDpi xmlns:a14="http://schemas.microsoft.com/office/drawing/2010/main" val="0"/>
+              </a:ext>
+            </a:extLst>
+          </a:blip>
+          <a:srcRect/>
+          <a:stretch>
+            <a:fillRect/>
+          </a:stretch>
+        </p:blipFill>
+        <p:spPr bwMode="auto">
+          <a:xfrm>
+            <a:off x="5665539" y="2823270"/>
+            <a:ext cx="5934075" cy="3486150"/>
+          </a:xfrm>
+          <a:prstGeom prst="rect">
+            <a:avLst/>
+          </a:prstGeom>
+          <a:noFill/>
+          <a:extLst>
+            <a:ext uri="{909E8E84-426E-40DD-AFC4-6F175D3DCCD1}">
+              <a14:hiddenFill xmlns:a14="http://schemas.microsoft.com/office/drawing/2010/main">
+                <a:solidFill>
+                  <a:srgbClr val="FFFFFF"/>
+                </a:solidFill>
+              </a14:hiddenFill>
+            </a:ext>
+          </a:extLst>
+        </p:spPr>
+      </p:pic>
+      <p:pic>
+        <p:nvPicPr>
+          <p:cNvPr id="1027" name="Picture 3" descr="D:\temp\Capture2#.PNG"/>
+          <p:cNvPicPr>
+            <a:picLocks noChangeAspect="1" noChangeArrowheads="1"/>
+          </p:cNvPicPr>
+          <p:nvPr/>
+        </p:nvPicPr>
+        <p:blipFill>
+          <a:blip r:embed="rId3">
+            <a:extLst>
+              <a:ext uri="{28A0092B-C50C-407E-A947-70E740481C1C}">
+                <a14:useLocalDpi xmlns:a14="http://schemas.microsoft.com/office/drawing/2010/main" val="0"/>
+              </a:ext>
+            </a:extLst>
+          </a:blip>
+          <a:srcRect/>
+          <a:stretch>
+            <a:fillRect/>
+          </a:stretch>
+        </p:blipFill>
+        <p:spPr bwMode="auto">
+          <a:xfrm>
+            <a:off x="491356" y="1413570"/>
+            <a:ext cx="5954712" cy="3152775"/>
+          </a:xfrm>
+          <a:prstGeom prst="rect">
+            <a:avLst/>
+          </a:prstGeom>
+          <a:noFill/>
+          <a:extLst>
+            <a:ext uri="{909E8E84-426E-40DD-AFC4-6F175D3DCCD1}">
+              <a14:hiddenFill xmlns:a14="http://schemas.microsoft.com/office/drawing/2010/main">
+                <a:solidFill>
+                  <a:srgbClr val="FFFFFF"/>
+                </a:solidFill>
+              </a14:hiddenFill>
+            </a:ext>
+          </a:extLst>
+        </p:spPr>
+      </p:pic>
+      <p:sp>
+        <p:nvSpPr>
+          <p:cNvPr id="5" name="TextBox 4"/>
+          <p:cNvSpPr txBox="1"/>
+          <p:nvPr/>
+        </p:nvSpPr>
+        <p:spPr>
+          <a:xfrm>
+            <a:off x="491356" y="4664963"/>
+            <a:ext cx="3372718" cy="276999"/>
+          </a:xfrm>
+          <a:prstGeom prst="rect">
+            <a:avLst/>
+          </a:prstGeom>
+          <a:noFill/>
+        </p:spPr>
+        <p:txBody>
+          <a:bodyPr wrap="none" lIns="0" tIns="0" rIns="0" bIns="0" rtlCol="0">
+            <a:spAutoFit/>
+          </a:bodyPr>
+          <a:lstStyle/>
+          <a:p>
+            <a:pPr fontAlgn="base">
+              <a:spcBef>
+                <a:spcPct val="50000"/>
+              </a:spcBef>
+              <a:spcAft>
+                <a:spcPct val="0"/>
+              </a:spcAft>
+              <a:buClr>
+                <a:srgbClr val="F0AB00"/>
+              </a:buClr>
+              <a:buSzPct val="80000"/>
+            </a:pPr>
+            <a:r>
+              <a:rPr lang="de-DE" sz="1800" b="1" kern="0" dirty="0" smtClean="0">
+                <a:ea typeface="Arial Unicode MS" pitchFamily="34" charset="-128"/>
+                <a:cs typeface="Arial Unicode MS" pitchFamily="34" charset="-128"/>
+              </a:rPr>
+              <a:t>OTA </a:t>
+            </a:r>
+            <a:r>
+              <a:rPr lang="de-DE" sz="1800" b="1" kern="0" dirty="0" err="1" smtClean="0">
+                <a:ea typeface="Arial Unicode MS" pitchFamily="34" charset="-128"/>
+                <a:cs typeface="Arial Unicode MS" pitchFamily="34" charset="-128"/>
+              </a:rPr>
+              <a:t>Install</a:t>
+            </a:r>
+            <a:r>
+              <a:rPr lang="de-DE" sz="1800" b="1" kern="0" dirty="0" smtClean="0">
+                <a:ea typeface="Arial Unicode MS" pitchFamily="34" charset="-128"/>
+                <a:cs typeface="Arial Unicode MS" pitchFamily="34" charset="-128"/>
+              </a:rPr>
+              <a:t> Page (</a:t>
+            </a:r>
+            <a:r>
+              <a:rPr lang="de-DE" sz="1800" b="1" kern="0" dirty="0" err="1" smtClean="0">
+                <a:ea typeface="Arial Unicode MS" pitchFamily="34" charset="-128"/>
+                <a:cs typeface="Arial Unicode MS" pitchFamily="34" charset="-128"/>
+              </a:rPr>
+              <a:t>iPhone</a:t>
+            </a:r>
+            <a:r>
+              <a:rPr lang="de-DE" sz="1800" b="1" kern="0" dirty="0" smtClean="0">
+                <a:ea typeface="Arial Unicode MS" pitchFamily="34" charset="-128"/>
+                <a:cs typeface="Arial Unicode MS" pitchFamily="34" charset="-128"/>
+              </a:rPr>
+              <a:t>/</a:t>
+            </a:r>
+            <a:r>
+              <a:rPr lang="de-DE" sz="1800" b="1" kern="0" dirty="0" err="1" smtClean="0">
+                <a:ea typeface="Arial Unicode MS" pitchFamily="34" charset="-128"/>
+                <a:cs typeface="Arial Unicode MS" pitchFamily="34" charset="-128"/>
+              </a:rPr>
+              <a:t>iPad</a:t>
+            </a:r>
+            <a:r>
+              <a:rPr lang="de-DE" sz="1800" b="1" kern="0" dirty="0" smtClean="0">
+                <a:ea typeface="Arial Unicode MS" pitchFamily="34" charset="-128"/>
+                <a:cs typeface="Arial Unicode MS" pitchFamily="34" charset="-128"/>
+              </a:rPr>
+              <a:t>)</a:t>
+            </a:r>
+            <a:endParaRPr lang="en-US" sz="1800" b="1" kern="0" dirty="0" err="1" smtClean="0">
+              <a:ea typeface="Arial Unicode MS" pitchFamily="34" charset="-128"/>
+              <a:cs typeface="Arial Unicode MS" pitchFamily="34" charset="-128"/>
+            </a:endParaRPr>
+          </a:p>
+        </p:txBody>
+      </p:sp>
+      <p:sp>
+        <p:nvSpPr>
+          <p:cNvPr id="8" name="TextBox 7"/>
+          <p:cNvSpPr txBox="1"/>
+          <p:nvPr/>
+        </p:nvSpPr>
+        <p:spPr>
+          <a:xfrm>
+            <a:off x="9322345" y="2421682"/>
+            <a:ext cx="2269852" cy="276999"/>
+          </a:xfrm>
+          <a:prstGeom prst="rect">
+            <a:avLst/>
+          </a:prstGeom>
+          <a:noFill/>
+        </p:spPr>
+        <p:txBody>
+          <a:bodyPr wrap="none" lIns="0" tIns="0" rIns="0" bIns="0" rtlCol="0">
+            <a:spAutoFit/>
+          </a:bodyPr>
+          <a:lstStyle/>
+          <a:p>
+            <a:pPr algn="r" fontAlgn="base">
+              <a:spcBef>
+                <a:spcPct val="50000"/>
+              </a:spcBef>
+              <a:spcAft>
+                <a:spcPct val="0"/>
+              </a:spcAft>
+              <a:buClr>
+                <a:srgbClr val="F0AB00"/>
+              </a:buClr>
+              <a:buSzPct val="80000"/>
+            </a:pPr>
+            <a:r>
+              <a:rPr lang="de-DE" sz="1800" b="1" kern="0" dirty="0" smtClean="0">
+                <a:ea typeface="Arial Unicode MS" pitchFamily="34" charset="-128"/>
+                <a:cs typeface="Arial Unicode MS" pitchFamily="34" charset="-128"/>
+              </a:rPr>
+              <a:t>OTA </a:t>
+            </a:r>
+            <a:r>
+              <a:rPr lang="de-DE" sz="1800" b="1" kern="0" dirty="0" err="1" smtClean="0">
+                <a:ea typeface="Arial Unicode MS" pitchFamily="34" charset="-128"/>
+                <a:cs typeface="Arial Unicode MS" pitchFamily="34" charset="-128"/>
+              </a:rPr>
+              <a:t>Install</a:t>
+            </a:r>
+            <a:r>
+              <a:rPr lang="de-DE" sz="1800" b="1" kern="0" dirty="0" smtClean="0">
+                <a:ea typeface="Arial Unicode MS" pitchFamily="34" charset="-128"/>
+                <a:cs typeface="Arial Unicode MS" pitchFamily="34" charset="-128"/>
+              </a:rPr>
+              <a:t> QR Code</a:t>
+            </a:r>
+            <a:endParaRPr lang="en-US" sz="1800" b="1" kern="0" dirty="0" err="1" smtClean="0">
+              <a:ea typeface="Arial Unicode MS" pitchFamily="34" charset="-128"/>
+              <a:cs typeface="Arial Unicode MS" pitchFamily="34" charset="-128"/>
+            </a:endParaRPr>
+          </a:p>
+        </p:txBody>
+      </p:sp>
+    </p:spTree>
+    <p:extLst>
+      <p:ext uri="{BB962C8B-B14F-4D97-AF65-F5344CB8AC3E}">
+        <p14:creationId xmlns:p14="http://schemas.microsoft.com/office/powerpoint/2010/main" val="1664843285"/>
+      </p:ext>
+    </p:extLst>
+  </p:cSld>
+  <p:clrMapOvr>
+    <a:masterClrMapping/>
+  </p:clrMapOvr>
+</p:sld>
+</file>
+
+<file path=ppt/slides/slide11.xml><?xml version="1.0" encoding="utf-8"?>
+<p:sld xmlns:a="http://schemas.openxmlformats.org/drawingml/2006/main" xmlns:r="http://schemas.openxmlformats.org/officeDocument/2006/relationships" xmlns:p="http://schemas.openxmlformats.org/presentationml/2006/main">
+  <p:cSld>
+    <p:spTree>
+      <p:nvGrpSpPr>
+        <p:cNvPr id="1" name=""/>
+        <p:cNvGrpSpPr/>
+        <p:nvPr/>
+      </p:nvGrpSpPr>
+      <p:grpSpPr>
+        <a:xfrm>
+          <a:off x="0" y="0"/>
+          <a:ext cx="0" cy="0"/>
+          <a:chOff x="0" y="0"/>
+          <a:chExt cx="0" cy="0"/>
+        </a:xfrm>
+      </p:grpSpPr>
+      <p:sp>
+        <p:nvSpPr>
+          <p:cNvPr id="2" name="Title 1"/>
+          <p:cNvSpPr>
+            <a:spLocks noGrp="1"/>
+          </p:cNvSpPr>
+          <p:nvPr>
+            <p:ph type="title"/>
+          </p:nvPr>
+        </p:nvSpPr>
+        <p:spPr/>
+        <p:txBody>
+          <a:bodyPr/>
+          <a:lstStyle/>
+          <a:p>
+            <a:r>
+              <a:rPr lang="de-DE" dirty="0" smtClean="0"/>
+              <a:t>Features </a:t>
+            </a:r>
+            <a:r>
+              <a:rPr lang="de-DE" dirty="0" err="1" smtClean="0"/>
+              <a:t>of</a:t>
+            </a:r>
+            <a:r>
+              <a:rPr lang="de-DE" dirty="0" smtClean="0"/>
+              <a:t> </a:t>
+            </a:r>
+            <a:r>
+              <a:rPr lang="de-DE" dirty="0" err="1" smtClean="0"/>
+              <a:t>the</a:t>
+            </a:r>
+            <a:r>
+              <a:rPr lang="de-DE" dirty="0" smtClean="0"/>
+              <a:t> OTA Service</a:t>
+            </a:r>
+            <a:endParaRPr lang="en-US" dirty="0"/>
+          </a:p>
+        </p:txBody>
+      </p:sp>
+      <p:sp>
+        <p:nvSpPr>
+          <p:cNvPr id="5" name="TextBox 4"/>
+          <p:cNvSpPr txBox="1"/>
+          <p:nvPr/>
+        </p:nvSpPr>
+        <p:spPr>
+          <a:xfrm>
+            <a:off x="2031231" y="1917626"/>
+            <a:ext cx="3821559" cy="276999"/>
+          </a:xfrm>
+          <a:prstGeom prst="rect">
+            <a:avLst/>
+          </a:prstGeom>
+          <a:noFill/>
+        </p:spPr>
+        <p:txBody>
+          <a:bodyPr wrap="none" lIns="0" tIns="0" rIns="0" bIns="0" rtlCol="0">
+            <a:spAutoFit/>
+          </a:bodyPr>
+          <a:lstStyle/>
+          <a:p>
+            <a:pPr fontAlgn="base">
+              <a:spcBef>
+                <a:spcPct val="50000"/>
+              </a:spcBef>
+              <a:spcAft>
+                <a:spcPct val="0"/>
+              </a:spcAft>
+              <a:buClr>
+                <a:srgbClr val="F0AB00"/>
+              </a:buClr>
+              <a:buSzPct val="80000"/>
+            </a:pPr>
+            <a:r>
+              <a:rPr lang="de-DE" sz="1800" b="1" kern="0" dirty="0">
+                <a:ea typeface="Arial Unicode MS" pitchFamily="34" charset="-128"/>
+                <a:cs typeface="Arial Unicode MS" pitchFamily="34" charset="-128"/>
+              </a:rPr>
+              <a:t>OTA </a:t>
+            </a:r>
+            <a:r>
+              <a:rPr lang="de-DE" sz="1800" b="1" kern="0" dirty="0" err="1">
+                <a:ea typeface="Arial Unicode MS" pitchFamily="34" charset="-128"/>
+                <a:cs typeface="Arial Unicode MS" pitchFamily="34" charset="-128"/>
+              </a:rPr>
+              <a:t>Install</a:t>
+            </a:r>
+            <a:r>
+              <a:rPr lang="de-DE" sz="1800" b="1" kern="0" dirty="0">
+                <a:ea typeface="Arial Unicode MS" pitchFamily="34" charset="-128"/>
+                <a:cs typeface="Arial Unicode MS" pitchFamily="34" charset="-128"/>
+              </a:rPr>
+              <a:t> Page </a:t>
+            </a:r>
+            <a:r>
+              <a:rPr lang="de-DE" sz="1800" b="1" kern="0" dirty="0" smtClean="0">
+                <a:ea typeface="Arial Unicode MS" pitchFamily="34" charset="-128"/>
+                <a:cs typeface="Arial Unicode MS" pitchFamily="34" charset="-128"/>
+              </a:rPr>
+              <a:t>(</a:t>
+            </a:r>
+            <a:r>
+              <a:rPr lang="de-DE" sz="1800" b="1" kern="0" dirty="0" err="1" smtClean="0">
+                <a:ea typeface="Arial Unicode MS" pitchFamily="34" charset="-128"/>
+                <a:cs typeface="Arial Unicode MS" pitchFamily="34" charset="-128"/>
+              </a:rPr>
+              <a:t>d</a:t>
+            </a:r>
+            <a:r>
+              <a:rPr lang="de-DE" sz="1800" b="1" kern="0" dirty="0" err="1" smtClean="0">
+                <a:ea typeface="Arial Unicode MS" pitchFamily="34" charset="-128"/>
+                <a:cs typeface="Arial Unicode MS" pitchFamily="34" charset="-128"/>
+              </a:rPr>
+              <a:t>esktop</a:t>
+            </a:r>
+            <a:r>
+              <a:rPr lang="de-DE" sz="1800" b="1" kern="0" dirty="0" smtClean="0">
+                <a:ea typeface="Arial Unicode MS" pitchFamily="34" charset="-128"/>
+                <a:cs typeface="Arial Unicode MS" pitchFamily="34" charset="-128"/>
+              </a:rPr>
+              <a:t> </a:t>
+            </a:r>
+            <a:r>
+              <a:rPr lang="de-DE" sz="1800" b="1" kern="0" dirty="0" err="1" smtClean="0">
+                <a:ea typeface="Arial Unicode MS" pitchFamily="34" charset="-128"/>
+                <a:cs typeface="Arial Unicode MS" pitchFamily="34" charset="-128"/>
+              </a:rPr>
+              <a:t>version</a:t>
+            </a:r>
+            <a:r>
+              <a:rPr lang="de-DE" sz="1800" b="1" kern="0" dirty="0" smtClean="0">
+                <a:ea typeface="Arial Unicode MS" pitchFamily="34" charset="-128"/>
+                <a:cs typeface="Arial Unicode MS" pitchFamily="34" charset="-128"/>
+              </a:rPr>
+              <a:t>)</a:t>
+            </a:r>
+            <a:endParaRPr lang="en-US" sz="1800" b="1" kern="0" dirty="0" err="1" smtClean="0">
+              <a:ea typeface="Arial Unicode MS" pitchFamily="34" charset="-128"/>
+              <a:cs typeface="Arial Unicode MS" pitchFamily="34" charset="-128"/>
+            </a:endParaRPr>
+          </a:p>
+        </p:txBody>
+      </p:sp>
+      <p:pic>
+        <p:nvPicPr>
+          <p:cNvPr id="2050" name="Picture 2" descr="D:\temp\Capture4.PNG"/>
+          <p:cNvPicPr>
+            <a:picLocks noChangeAspect="1" noChangeArrowheads="1"/>
+          </p:cNvPicPr>
+          <p:nvPr/>
+        </p:nvPicPr>
+        <p:blipFill>
+          <a:blip r:embed="rId2">
+            <a:extLst>
+              <a:ext uri="{28A0092B-C50C-407E-A947-70E740481C1C}">
+                <a14:useLocalDpi xmlns:a14="http://schemas.microsoft.com/office/drawing/2010/main" val="0"/>
+              </a:ext>
+            </a:extLst>
+          </a:blip>
+          <a:srcRect/>
+          <a:stretch>
+            <a:fillRect/>
+          </a:stretch>
+        </p:blipFill>
+        <p:spPr bwMode="auto">
+          <a:xfrm>
+            <a:off x="2031231" y="2314575"/>
+            <a:ext cx="8126412" cy="3067050"/>
+          </a:xfrm>
+          <a:prstGeom prst="rect">
+            <a:avLst/>
+          </a:prstGeom>
+          <a:noFill/>
+          <a:extLst>
+            <a:ext uri="{909E8E84-426E-40DD-AFC4-6F175D3DCCD1}">
+              <a14:hiddenFill xmlns:a14="http://schemas.microsoft.com/office/drawing/2010/main">
+                <a:solidFill>
+                  <a:srgbClr val="FFFFFF"/>
+                </a:solidFill>
+              </a14:hiddenFill>
+            </a:ext>
+          </a:extLst>
+        </p:spPr>
+      </p:pic>
+    </p:spTree>
+    <p:extLst>
+      <p:ext uri="{BB962C8B-B14F-4D97-AF65-F5344CB8AC3E}">
+        <p14:creationId xmlns:p14="http://schemas.microsoft.com/office/powerpoint/2010/main" val="3213101980"/>
+      </p:ext>
+    </p:extLst>
+  </p:cSld>
+  <p:clrMapOvr>
+    <a:masterClrMapping/>
+  </p:clrMapOvr>
+</p:sld>
+</file>
+
+<file path=ppt/slides/slide12.xml><?xml version="1.0" encoding="utf-8"?>
+<p:sld xmlns:a="http://schemas.openxmlformats.org/drawingml/2006/main" xmlns:r="http://schemas.openxmlformats.org/officeDocument/2006/relationships" xmlns:p="http://schemas.openxmlformats.org/presentationml/2006/main">
+  <p:cSld>
+    <p:spTree>
+      <p:nvGrpSpPr>
+        <p:cNvPr id="1" name=""/>
+        <p:cNvGrpSpPr/>
+        <p:nvPr/>
+      </p:nvGrpSpPr>
+      <p:grpSpPr>
+        <a:xfrm>
+          <a:off x="0" y="0"/>
+          <a:ext cx="0" cy="0"/>
+          <a:chOff x="0" y="0"/>
+          <a:chExt cx="0" cy="0"/>
+        </a:xfrm>
+      </p:grpSpPr>
+      <p:sp>
+        <p:nvSpPr>
           <p:cNvPr id="3" name="Title 2"/>
           <p:cNvSpPr>
             <a:spLocks noGrp="1"/>
@@ -10414,7 +10933,7 @@
 </p:sld>
 </file>
 
-<file path=ppt/slides/slide11.xml><?xml version="1.0" encoding="utf-8"?>
+<file path=ppt/slides/slide13.xml><?xml version="1.0" encoding="utf-8"?>
 <p:sld xmlns:a="http://schemas.openxmlformats.org/drawingml/2006/main" xmlns:r="http://schemas.openxmlformats.org/officeDocument/2006/relationships" xmlns:p="http://schemas.openxmlformats.org/presentationml/2006/main">
   <p:cSld>
     <p:spTree>
@@ -12989,7 +13508,7 @@
 </p:sld>
 </file>
 
-<file path=ppt/slides/slide12.xml><?xml version="1.0" encoding="utf-8"?>
+<file path=ppt/slides/slide14.xml><?xml version="1.0" encoding="utf-8"?>
 <p:sld xmlns:a="http://schemas.openxmlformats.org/drawingml/2006/main" xmlns:r="http://schemas.openxmlformats.org/officeDocument/2006/relationships" xmlns:p="http://schemas.openxmlformats.org/presentationml/2006/main">
   <p:cSld>
     <p:spTree>
@@ -15721,7 +16240,7 @@
 </p:sld>
 </file>
 
-<file path=ppt/slides/slide13.xml><?xml version="1.0" encoding="utf-8"?>
+<file path=ppt/slides/slide15.xml><?xml version="1.0" encoding="utf-8"?>
 <p:sld xmlns:a="http://schemas.openxmlformats.org/drawingml/2006/main" xmlns:r="http://schemas.openxmlformats.org/officeDocument/2006/relationships" xmlns:p="http://schemas.openxmlformats.org/presentationml/2006/main">
   <p:cSld>
     <p:spTree>
@@ -17293,7 +17812,7 @@
 </p:sld>
 </file>
 
-<file path=ppt/slides/slide14.xml><?xml version="1.0" encoding="utf-8"?>
+<file path=ppt/slides/slide16.xml><?xml version="1.0" encoding="utf-8"?>
 <p:sld xmlns:a="http://schemas.openxmlformats.org/drawingml/2006/main" xmlns:r="http://schemas.openxmlformats.org/officeDocument/2006/relationships" xmlns:p="http://schemas.openxmlformats.org/presentationml/2006/main">
   <p:cSld>
     <p:spTree>
@@ -17410,7 +17929,7 @@
 </p:sld>
 </file>
 
-<file path=ppt/slides/slide15.xml><?xml version="1.0" encoding="utf-8"?>
+<file path=ppt/slides/slide17.xml><?xml version="1.0" encoding="utf-8"?>
 <p:sld xmlns:a="http://schemas.openxmlformats.org/drawingml/2006/main" xmlns:r="http://schemas.openxmlformats.org/officeDocument/2006/relationships" xmlns:p="http://schemas.openxmlformats.org/presentationml/2006/main" show="0">
   <p:cSld>
     <p:spTree>
@@ -18263,7 +18782,7 @@
 </p:sld>
 </file>
 
-<file path=ppt/slides/slide16.xml><?xml version="1.0" encoding="utf-8"?>
+<file path=ppt/slides/slide18.xml><?xml version="1.0" encoding="utf-8"?>
 <p:sld xmlns:a="http://schemas.openxmlformats.org/drawingml/2006/main" xmlns:r="http://schemas.openxmlformats.org/officeDocument/2006/relationships" xmlns:p="http://schemas.openxmlformats.org/presentationml/2006/main" show="0">
   <p:cSld>
     <p:spTree>
@@ -18296,7 +18815,7 @@
 </p:sld>
 </file>
 
-<file path=ppt/slides/slide17.xml><?xml version="1.0" encoding="utf-8"?>
+<file path=ppt/slides/slide19.xml><?xml version="1.0" encoding="utf-8"?>
 <p:sld xmlns:a="http://schemas.openxmlformats.org/drawingml/2006/main" xmlns:r="http://schemas.openxmlformats.org/officeDocument/2006/relationships" xmlns:p="http://schemas.openxmlformats.org/presentationml/2006/main" show="0">
   <p:cSld>
     <p:spTree>
@@ -18490,7 +19009,6 @@
               <a:rPr lang="en-US" b="1" dirty="0" smtClean="0"/>
               <a:t>Overview</a:t>
             </a:r>
-            <a:endParaRPr lang="en-US" b="1" dirty="0" smtClean="0"/>
           </a:p>
           <a:p>
             <a:pPr lvl="1"/>
@@ -18626,11 +19144,7 @@
             <a:pPr lvl="1"/>
             <a:r>
               <a:rPr lang="en-US" b="1" dirty="0" smtClean="0"/>
-              <a:t>How </a:t>
-            </a:r>
-            <a:r>
-              <a:rPr lang="en-US" b="1" dirty="0" smtClean="0"/>
-              <a:t>the OTA </a:t>
+              <a:t>How the OTA </a:t>
             </a:r>
             <a:r>
               <a:rPr lang="en-US" b="1" dirty="0"/>
@@ -18862,8 +19376,76 @@
             </a:r>
             <a:r>
               <a:rPr lang="de-DE" b="1" dirty="0" smtClean="0"/>
-              <a:t> Enterprise Account</a:t>
-            </a:r>
+              <a:t> Enterprise </a:t>
+            </a:r>
+            <a:r>
+              <a:rPr lang="de-DE" b="1" dirty="0"/>
+              <a:t>Account</a:t>
+            </a:r>
+            <a:br>
+              <a:rPr lang="de-DE" b="1" dirty="0"/>
+            </a:br>
+            <a:r>
+              <a:rPr lang="de-DE" b="1" dirty="0" err="1"/>
+              <a:t>or</a:t>
+            </a:r>
+            <a:r>
+              <a:rPr lang="de-DE" b="1" dirty="0"/>
+              <a:t> a </a:t>
+            </a:r>
+            <a:r>
+              <a:rPr lang="de-DE" b="1" dirty="0" err="1"/>
+              <a:t>development</a:t>
+            </a:r>
+            <a:r>
+              <a:rPr lang="de-DE" b="1" dirty="0"/>
+              <a:t> </a:t>
+            </a:r>
+            <a:r>
+              <a:rPr lang="de-DE" b="1" dirty="0" err="1"/>
+              <a:t>team</a:t>
+            </a:r>
+            <a:r>
+              <a:rPr lang="de-DE" b="1" dirty="0"/>
+              <a:t> </a:t>
+            </a:r>
+            <a:r>
+              <a:rPr lang="de-DE" b="1" dirty="0" err="1"/>
+              <a:t>having</a:t>
+            </a:r>
+            <a:r>
+              <a:rPr lang="de-DE" b="1" dirty="0"/>
+              <a:t> a </a:t>
+            </a:r>
+            <a:r>
+              <a:rPr lang="de-DE" b="1" dirty="0" err="1"/>
+              <a:t>continuous</a:t>
+            </a:r>
+            <a:r>
+              <a:rPr lang="de-DE" b="1" dirty="0"/>
+              <a:t> </a:t>
+            </a:r>
+            <a:r>
+              <a:rPr lang="de-DE" b="1" dirty="0" err="1"/>
+              <a:t>integration</a:t>
+            </a:r>
+            <a:r>
+              <a:rPr lang="de-DE" b="1" dirty="0"/>
+              <a:t> </a:t>
+            </a:r>
+            <a:r>
+              <a:rPr lang="de-DE" b="1" dirty="0" err="1"/>
+              <a:t>build</a:t>
+            </a:r>
+            <a:r>
+              <a:rPr lang="de-DE" b="1" dirty="0"/>
+              <a:t> </a:t>
+            </a:r>
+            <a:r>
+              <a:rPr lang="de-DE" b="1" dirty="0" err="1"/>
+              <a:t>server</a:t>
+            </a:r>
+            <a:endParaRPr lang="de-DE" b="1" dirty="0"/>
           </a:p>
           <a:p>
             <a:pPr marL="342900" indent="-342900">
@@ -19395,11 +19977,7 @@
             </a:r>
             <a:r>
               <a:rPr lang="de-DE" dirty="0" smtClean="0"/>
-              <a:t> </a:t>
-            </a:r>
-            <a:r>
-              <a:rPr lang="de-DE" dirty="0" smtClean="0"/>
-              <a:t>An App On A Device</a:t>
+              <a:t> An App On A Device</a:t>
             </a:r>
             <a:endParaRPr lang="de-DE" dirty="0"/>
           </a:p>
@@ -19711,7 +20289,7 @@
             </a:pPr>
             <a:r>
               <a:rPr lang="de-DE" dirty="0" smtClean="0"/>
-              <a:t>1 </a:t>
+              <a:t>0-1 </a:t>
             </a:r>
             <a:r>
               <a:rPr lang="de-DE" dirty="0" err="1" smtClean="0"/>

</xml_diff>